<commit_message>
Update outlier points on convex hull
</commit_message>
<xml_diff>
--- a/figures/final_figs/figs.pptx
+++ b/figures/final_figs/figs.pptx
@@ -249,7 +249,7 @@
           <a:p>
             <a:fld id="{84FDAD1B-D8A9-CB4E-B013-34AAA91A7A87}" type="datetimeFigureOut">
               <a:rPr lang="en-US" smtClean="0"/>
-              <a:t>12/24/20</a:t>
+              <a:t>12/26/20</a:t>
             </a:fld>
             <a:endParaRPr lang="en-US"/>
           </a:p>
@@ -414,7 +414,7 @@
           <a:p>
             <a:fld id="{84FDAD1B-D8A9-CB4E-B013-34AAA91A7A87}" type="datetimeFigureOut">
               <a:rPr lang="en-US" smtClean="0"/>
-              <a:t>12/24/20</a:t>
+              <a:t>12/26/20</a:t>
             </a:fld>
             <a:endParaRPr lang="en-US"/>
           </a:p>
@@ -589,7 +589,7 @@
           <a:p>
             <a:fld id="{84FDAD1B-D8A9-CB4E-B013-34AAA91A7A87}" type="datetimeFigureOut">
               <a:rPr lang="en-US" smtClean="0"/>
-              <a:t>12/24/20</a:t>
+              <a:t>12/26/20</a:t>
             </a:fld>
             <a:endParaRPr lang="en-US"/>
           </a:p>
@@ -754,7 +754,7 @@
           <a:p>
             <a:fld id="{84FDAD1B-D8A9-CB4E-B013-34AAA91A7A87}" type="datetimeFigureOut">
               <a:rPr lang="en-US" smtClean="0"/>
-              <a:t>12/24/20</a:t>
+              <a:t>12/26/20</a:t>
             </a:fld>
             <a:endParaRPr lang="en-US"/>
           </a:p>
@@ -993,7 +993,7 @@
           <a:p>
             <a:fld id="{84FDAD1B-D8A9-CB4E-B013-34AAA91A7A87}" type="datetimeFigureOut">
               <a:rPr lang="en-US" smtClean="0"/>
-              <a:t>12/24/20</a:t>
+              <a:t>12/26/20</a:t>
             </a:fld>
             <a:endParaRPr lang="en-US"/>
           </a:p>
@@ -1220,7 +1220,7 @@
           <a:p>
             <a:fld id="{84FDAD1B-D8A9-CB4E-B013-34AAA91A7A87}" type="datetimeFigureOut">
               <a:rPr lang="en-US" smtClean="0"/>
-              <a:t>12/24/20</a:t>
+              <a:t>12/26/20</a:t>
             </a:fld>
             <a:endParaRPr lang="en-US"/>
           </a:p>
@@ -1582,7 +1582,7 @@
           <a:p>
             <a:fld id="{84FDAD1B-D8A9-CB4E-B013-34AAA91A7A87}" type="datetimeFigureOut">
               <a:rPr lang="en-US" smtClean="0"/>
-              <a:t>12/24/20</a:t>
+              <a:t>12/26/20</a:t>
             </a:fld>
             <a:endParaRPr lang="en-US"/>
           </a:p>
@@ -1695,7 +1695,7 @@
           <a:p>
             <a:fld id="{84FDAD1B-D8A9-CB4E-B013-34AAA91A7A87}" type="datetimeFigureOut">
               <a:rPr lang="en-US" smtClean="0"/>
-              <a:t>12/24/20</a:t>
+              <a:t>12/26/20</a:t>
             </a:fld>
             <a:endParaRPr lang="en-US"/>
           </a:p>
@@ -1785,7 +1785,7 @@
           <a:p>
             <a:fld id="{84FDAD1B-D8A9-CB4E-B013-34AAA91A7A87}" type="datetimeFigureOut">
               <a:rPr lang="en-US" smtClean="0"/>
-              <a:t>12/24/20</a:t>
+              <a:t>12/26/20</a:t>
             </a:fld>
             <a:endParaRPr lang="en-US"/>
           </a:p>
@@ -2057,7 +2057,7 @@
           <a:p>
             <a:fld id="{84FDAD1B-D8A9-CB4E-B013-34AAA91A7A87}" type="datetimeFigureOut">
               <a:rPr lang="en-US" smtClean="0"/>
-              <a:t>12/24/20</a:t>
+              <a:t>12/26/20</a:t>
             </a:fld>
             <a:endParaRPr lang="en-US"/>
           </a:p>
@@ -2309,7 +2309,7 @@
           <a:p>
             <a:fld id="{84FDAD1B-D8A9-CB4E-B013-34AAA91A7A87}" type="datetimeFigureOut">
               <a:rPr lang="en-US" smtClean="0"/>
-              <a:t>12/24/20</a:t>
+              <a:t>12/26/20</a:t>
             </a:fld>
             <a:endParaRPr lang="en-US"/>
           </a:p>
@@ -2517,7 +2517,7 @@
           <a:p>
             <a:fld id="{84FDAD1B-D8A9-CB4E-B013-34AAA91A7A87}" type="datetimeFigureOut">
               <a:rPr lang="en-US" smtClean="0"/>
-              <a:t>12/24/20</a:t>
+              <a:t>12/26/20</a:t>
             </a:fld>
             <a:endParaRPr lang="en-US"/>
           </a:p>
@@ -13562,7 +13562,7 @@
       </p:sp>
       <p:pic>
         <p:nvPicPr>
-          <p:cNvPr id="2" name="Picture 1"/>
+          <p:cNvPr id="4" name="Picture 3"/>
           <p:cNvPicPr>
             <a:picLocks noChangeAspect="1"/>
           </p:cNvPicPr>
@@ -13582,116 +13582,14 @@
         </p:blipFill>
         <p:spPr>
           <a:xfrm>
-            <a:off x="692259" y="336498"/>
-            <a:ext cx="5884193" cy="5884193"/>
+            <a:off x="304258" y="361479"/>
+            <a:ext cx="6927574" cy="6927574"/>
           </a:xfrm>
           <a:prstGeom prst="rect">
             <a:avLst/>
           </a:prstGeom>
         </p:spPr>
       </p:pic>
-      <p:sp>
-        <p:nvSpPr>
-          <p:cNvPr id="3" name="Oval 2"/>
-          <p:cNvSpPr/>
-          <p:nvPr/>
-        </p:nvSpPr>
-        <p:spPr>
-          <a:xfrm rot="18950482">
-            <a:off x="1656091" y="3297815"/>
-            <a:ext cx="1861826" cy="596242"/>
-          </a:xfrm>
-          <a:prstGeom prst="ellipse">
-            <a:avLst/>
-          </a:prstGeom>
-          <a:solidFill>
-            <a:srgbClr val="6E707D">
-              <a:alpha val="20000"/>
-            </a:srgbClr>
-          </a:solidFill>
-          <a:ln>
-            <a:solidFill>
-              <a:schemeClr val="tx1"/>
-            </a:solidFill>
-            <a:prstDash val="dash"/>
-          </a:ln>
-        </p:spPr>
-        <p:style>
-          <a:lnRef idx="2">
-            <a:schemeClr val="accent1">
-              <a:shade val="50000"/>
-            </a:schemeClr>
-          </a:lnRef>
-          <a:fillRef idx="1">
-            <a:schemeClr val="accent1"/>
-          </a:fillRef>
-          <a:effectRef idx="0">
-            <a:schemeClr val="accent1"/>
-          </a:effectRef>
-          <a:fontRef idx="minor">
-            <a:schemeClr val="lt1"/>
-          </a:fontRef>
-        </p:style>
-        <p:txBody>
-          <a:bodyPr rtlCol="0" anchor="ctr"/>
-          <a:lstStyle/>
-          <a:p>
-            <a:pPr algn="ctr"/>
-            <a:endParaRPr lang="en-US"/>
-          </a:p>
-        </p:txBody>
-      </p:sp>
-      <p:sp>
-        <p:nvSpPr>
-          <p:cNvPr id="10" name="Oval 9"/>
-          <p:cNvSpPr/>
-          <p:nvPr/>
-        </p:nvSpPr>
-        <p:spPr>
-          <a:xfrm rot="18950482">
-            <a:off x="2973687" y="3618512"/>
-            <a:ext cx="1861826" cy="974013"/>
-          </a:xfrm>
-          <a:prstGeom prst="ellipse">
-            <a:avLst/>
-          </a:prstGeom>
-          <a:solidFill>
-            <a:srgbClr val="6E707D">
-              <a:alpha val="20000"/>
-            </a:srgbClr>
-          </a:solidFill>
-          <a:ln>
-            <a:solidFill>
-              <a:schemeClr val="tx1"/>
-            </a:solidFill>
-            <a:prstDash val="dash"/>
-          </a:ln>
-        </p:spPr>
-        <p:style>
-          <a:lnRef idx="2">
-            <a:schemeClr val="accent1">
-              <a:shade val="50000"/>
-            </a:schemeClr>
-          </a:lnRef>
-          <a:fillRef idx="1">
-            <a:schemeClr val="accent1"/>
-          </a:fillRef>
-          <a:effectRef idx="0">
-            <a:schemeClr val="accent1"/>
-          </a:effectRef>
-          <a:fontRef idx="minor">
-            <a:schemeClr val="lt1"/>
-          </a:fontRef>
-        </p:style>
-        <p:txBody>
-          <a:bodyPr rtlCol="0" anchor="ctr"/>
-          <a:lstStyle/>
-          <a:p>
-            <a:pPr algn="ctr"/>
-            <a:endParaRPr lang="en-US"/>
-          </a:p>
-        </p:txBody>
-      </p:sp>
     </p:spTree>
     <p:extLst>
       <p:ext uri="{BB962C8B-B14F-4D97-AF65-F5344CB8AC3E}">
@@ -15595,7 +15493,7 @@
         </p:nvSpPr>
         <p:spPr>
           <a:xfrm>
-            <a:off x="447747" y="6654018"/>
+            <a:off x="1427954" y="6932314"/>
             <a:ext cx="759654" cy="211016"/>
           </a:xfrm>
           <a:prstGeom prst="rect">

</xml_diff>